<commit_message>
Added the output in PPT
</commit_message>
<xml_diff>
--- a/NUMERICAL_ANALYSIS_POISSON_PPT.pptx
+++ b/NUMERICAL_ANALYSIS_POISSON_PPT.pptx
@@ -18946,6 +18946,173 @@
               <a:rPr lang="en-IN" sz="3200" b="1" dirty="0"/>
               <a:t>Output:</a:t>
             </a:r>
+          </a:p>
+        </p:txBody>
+      </p:sp>
+      <p:pic>
+        <p:nvPicPr>
+          <p:cNvPr id="9" name="Picture 8">
+            <a:extLst>
+              <a:ext uri="{FF2B5EF4-FFF2-40B4-BE49-F238E27FC236}">
+                <a16:creationId xmlns:a16="http://schemas.microsoft.com/office/drawing/2014/main" id="{09A0DEE1-5A0A-A103-6427-1611B88912B6}"/>
+              </a:ext>
+            </a:extLst>
+          </p:cNvPr>
+          <p:cNvPicPr>
+            <a:picLocks noChangeAspect="1"/>
+          </p:cNvPicPr>
+          <p:nvPr/>
+        </p:nvPicPr>
+        <p:blipFill>
+          <a:blip r:embed="rId2"/>
+          <a:stretch>
+            <a:fillRect/>
+          </a:stretch>
+        </p:blipFill>
+        <p:spPr>
+          <a:xfrm>
+            <a:off x="1075610" y="1581912"/>
+            <a:ext cx="5073706" cy="3353805"/>
+          </a:xfrm>
+          <a:prstGeom prst="rect">
+            <a:avLst/>
+          </a:prstGeom>
+        </p:spPr>
+      </p:pic>
+      <p:sp>
+        <p:nvSpPr>
+          <p:cNvPr id="10" name="TextBox 9">
+            <a:extLst>
+              <a:ext uri="{FF2B5EF4-FFF2-40B4-BE49-F238E27FC236}">
+                <a16:creationId xmlns:a16="http://schemas.microsoft.com/office/drawing/2014/main" id="{B6A6DE80-9FA7-23EA-2F14-C4427EF17E23}"/>
+              </a:ext>
+            </a:extLst>
+          </p:cNvPr>
+          <p:cNvSpPr txBox="1"/>
+          <p:nvPr/>
+        </p:nvSpPr>
+        <p:spPr>
+          <a:xfrm>
+            <a:off x="1075610" y="5294314"/>
+            <a:ext cx="5964913" cy="923330"/>
+          </a:xfrm>
+          <a:prstGeom prst="rect">
+            <a:avLst/>
+          </a:prstGeom>
+          <a:noFill/>
+        </p:spPr>
+        <p:txBody>
+          <a:bodyPr wrap="square" rtlCol="0">
+            <a:spAutoFit/>
+          </a:bodyPr>
+          <a:lstStyle/>
+          <a:p>
+            <a:r>
+              <a:rPr lang="en-IN" b="0" i="0" dirty="0">
+                <a:effectLst/>
+                <a:latin typeface="Menlo" panose="020B0609030804020204" pitchFamily="49" charset="0"/>
+              </a:rPr>
+              <a:t>Jacobi finished in 1133 iterations. Gauss-Seidel finished in 595 iterations. SOR(omega=1.5) finished in 28 iterations.</a:t>
+            </a:r>
+            <a:endParaRPr lang="en-US" dirty="0"/>
+          </a:p>
+        </p:txBody>
+      </p:sp>
+      <p:sp>
+        <p:nvSpPr>
+          <p:cNvPr id="11" name="TextBox 10">
+            <a:extLst>
+              <a:ext uri="{FF2B5EF4-FFF2-40B4-BE49-F238E27FC236}">
+                <a16:creationId xmlns:a16="http://schemas.microsoft.com/office/drawing/2014/main" id="{F7AF9587-05E8-7EF8-D667-C160973EE851}"/>
+              </a:ext>
+            </a:extLst>
+          </p:cNvPr>
+          <p:cNvSpPr txBox="1"/>
+          <p:nvPr/>
+        </p:nvSpPr>
+        <p:spPr>
+          <a:xfrm>
+            <a:off x="1075610" y="6377617"/>
+            <a:ext cx="5210865" cy="3416320"/>
+          </a:xfrm>
+          <a:prstGeom prst="rect">
+            <a:avLst/>
+          </a:prstGeom>
+          <a:noFill/>
+        </p:spPr>
+        <p:txBody>
+          <a:bodyPr wrap="square" rtlCol="0">
+            <a:spAutoFit/>
+          </a:bodyPr>
+          <a:lstStyle/>
+          <a:p>
+            <a:r>
+              <a:rPr lang="en-IN" b="0" i="0" dirty="0">
+                <a:effectLst/>
+                <a:latin typeface="Menlo" panose="020B0609030804020204" pitchFamily="49" charset="0"/>
+              </a:rPr>
+              <a:t>Grid: 50 x 50, Interior Size = 2401 Sparse Solver Time: 0.054 s </a:t>
+            </a:r>
+          </a:p>
+          <a:p>
+            <a:r>
+              <a:rPr lang="en-IN" b="0" i="0" dirty="0">
+                <a:effectLst/>
+                <a:latin typeface="Menlo" panose="020B0609030804020204" pitchFamily="49" charset="0"/>
+              </a:rPr>
+              <a:t>Dense Solver Time: 0.111 s </a:t>
+            </a:r>
+          </a:p>
+          <a:p>
+            <a:r>
+              <a:rPr lang="en-IN" b="0" i="0" dirty="0">
+                <a:effectLst/>
+                <a:latin typeface="Menlo" panose="020B0609030804020204" pitchFamily="49" charset="0"/>
+              </a:rPr>
+              <a:t>Max Difference (Sparse-Dense) = 5.995204e-15 </a:t>
+            </a:r>
+          </a:p>
+          <a:p>
+            <a:endParaRPr lang="en-IN" dirty="0">
+              <a:latin typeface="Menlo" panose="020B0609030804020204" pitchFamily="49" charset="0"/>
+            </a:endParaRPr>
+          </a:p>
+          <a:p>
+            <a:r>
+              <a:rPr lang="en-IN" b="0" i="0" dirty="0">
+                <a:effectLst/>
+                <a:latin typeface="Menlo" panose="020B0609030804020204" pitchFamily="49" charset="0"/>
+              </a:rPr>
+              <a:t>Grid: 100 x 100, Interior Size = 9801 </a:t>
+            </a:r>
+          </a:p>
+          <a:p>
+            <a:r>
+              <a:rPr lang="en-IN" b="0" i="0" dirty="0">
+                <a:effectLst/>
+                <a:latin typeface="Menlo" panose="020B0609030804020204" pitchFamily="49" charset="0"/>
+              </a:rPr>
+              <a:t>Sparse Solver Time: 0.048 s </a:t>
+            </a:r>
+          </a:p>
+          <a:p>
+            <a:r>
+              <a:rPr lang="en-IN" b="0" i="0" dirty="0">
+                <a:effectLst/>
+                <a:latin typeface="Menlo" panose="020B0609030804020204" pitchFamily="49" charset="0"/>
+              </a:rPr>
+              <a:t>Dense Solver Time: 3.276 s </a:t>
+            </a:r>
+          </a:p>
+          <a:p>
+            <a:r>
+              <a:rPr lang="en-IN" b="0" i="0" dirty="0">
+                <a:effectLst/>
+                <a:latin typeface="Menlo" panose="020B0609030804020204" pitchFamily="49" charset="0"/>
+              </a:rPr>
+              <a:t>Max Difference (Sparse-Dense) = 9.658940e-15</a:t>
+            </a:r>
+            <a:endParaRPr lang="en-US" dirty="0"/>
           </a:p>
         </p:txBody>
       </p:sp>

</xml_diff>